<commit_message>
Changed TemplateConstants.h in the Response Matrices.C because I need to re-run the mtt files with the new mTT XSEC
</commit_message>
<xml_diff>
--- a/Vradya_erevniti_poster.pptx
+++ b/Vradya_erevniti_poster.pptx
@@ -197,7 +197,7 @@
           <a:p>
             <a:fld id="{790A4D4C-42ED-FB40-AA61-F5B1FE81BFAB}" type="datetimeFigureOut">
               <a:rPr lang="en-US" smtClean="0"/>
-              <a:t>9/24/19</a:t>
+              <a:t>2/17/20</a:t>
             </a:fld>
             <a:endParaRPr lang="en-US"/>
           </a:p>
@@ -679,7 +679,7 @@
           <a:p>
             <a:fld id="{18C03CCD-33E6-6C48-9803-C606A0DDFF16}" type="datetimeFigureOut">
               <a:rPr lang="en-US" smtClean="0"/>
-              <a:t>9/24/19</a:t>
+              <a:t>2/17/20</a:t>
             </a:fld>
             <a:endParaRPr lang="en-US"/>
           </a:p>
@@ -849,7 +849,7 @@
           <a:p>
             <a:fld id="{18C03CCD-33E6-6C48-9803-C606A0DDFF16}" type="datetimeFigureOut">
               <a:rPr lang="en-US" smtClean="0"/>
-              <a:t>9/24/19</a:t>
+              <a:t>2/17/20</a:t>
             </a:fld>
             <a:endParaRPr lang="en-US"/>
           </a:p>
@@ -1029,7 +1029,7 @@
           <a:p>
             <a:fld id="{18C03CCD-33E6-6C48-9803-C606A0DDFF16}" type="datetimeFigureOut">
               <a:rPr lang="en-US" smtClean="0"/>
-              <a:t>9/24/19</a:t>
+              <a:t>2/17/20</a:t>
             </a:fld>
             <a:endParaRPr lang="en-US"/>
           </a:p>
@@ -1199,7 +1199,7 @@
           <a:p>
             <a:fld id="{18C03CCD-33E6-6C48-9803-C606A0DDFF16}" type="datetimeFigureOut">
               <a:rPr lang="en-US" smtClean="0"/>
-              <a:t>9/24/19</a:t>
+              <a:t>2/17/20</a:t>
             </a:fld>
             <a:endParaRPr lang="en-US"/>
           </a:p>
@@ -1443,7 +1443,7 @@
           <a:p>
             <a:fld id="{18C03CCD-33E6-6C48-9803-C606A0DDFF16}" type="datetimeFigureOut">
               <a:rPr lang="en-US" smtClean="0"/>
-              <a:t>9/24/19</a:t>
+              <a:t>2/17/20</a:t>
             </a:fld>
             <a:endParaRPr lang="en-US"/>
           </a:p>
@@ -1675,7 +1675,7 @@
           <a:p>
             <a:fld id="{18C03CCD-33E6-6C48-9803-C606A0DDFF16}" type="datetimeFigureOut">
               <a:rPr lang="en-US" smtClean="0"/>
-              <a:t>9/24/19</a:t>
+              <a:t>2/17/20</a:t>
             </a:fld>
             <a:endParaRPr lang="en-US"/>
           </a:p>
@@ -2042,7 +2042,7 @@
           <a:p>
             <a:fld id="{18C03CCD-33E6-6C48-9803-C606A0DDFF16}" type="datetimeFigureOut">
               <a:rPr lang="en-US" smtClean="0"/>
-              <a:t>9/24/19</a:t>
+              <a:t>2/17/20</a:t>
             </a:fld>
             <a:endParaRPr lang="en-US"/>
           </a:p>
@@ -2160,7 +2160,7 @@
           <a:p>
             <a:fld id="{18C03CCD-33E6-6C48-9803-C606A0DDFF16}" type="datetimeFigureOut">
               <a:rPr lang="en-US" smtClean="0"/>
-              <a:t>9/24/19</a:t>
+              <a:t>2/17/20</a:t>
             </a:fld>
             <a:endParaRPr lang="en-US"/>
           </a:p>
@@ -2255,7 +2255,7 @@
           <a:p>
             <a:fld id="{18C03CCD-33E6-6C48-9803-C606A0DDFF16}" type="datetimeFigureOut">
               <a:rPr lang="en-US" smtClean="0"/>
-              <a:t>9/24/19</a:t>
+              <a:t>2/17/20</a:t>
             </a:fld>
             <a:endParaRPr lang="en-US"/>
           </a:p>
@@ -2532,7 +2532,7 @@
           <a:p>
             <a:fld id="{18C03CCD-33E6-6C48-9803-C606A0DDFF16}" type="datetimeFigureOut">
               <a:rPr lang="en-US" smtClean="0"/>
-              <a:t>9/24/19</a:t>
+              <a:t>2/17/20</a:t>
             </a:fld>
             <a:endParaRPr lang="en-US"/>
           </a:p>
@@ -2789,7 +2789,7 @@
           <a:p>
             <a:fld id="{18C03CCD-33E6-6C48-9803-C606A0DDFF16}" type="datetimeFigureOut">
               <a:rPr lang="en-US" smtClean="0"/>
-              <a:t>9/24/19</a:t>
+              <a:t>2/17/20</a:t>
             </a:fld>
             <a:endParaRPr lang="en-US"/>
           </a:p>
@@ -3002,7 +3002,7 @@
           <a:p>
             <a:fld id="{18C03CCD-33E6-6C48-9803-C606A0DDFF16}" type="datetimeFigureOut">
               <a:rPr lang="en-US" smtClean="0"/>
-              <a:t>9/24/19</a:t>
+              <a:t>2/17/20</a:t>
             </a:fld>
             <a:endParaRPr lang="en-US"/>
           </a:p>

</xml_diff>